<commit_message>
pptx pdf 파일 수정
</commit_message>
<xml_diff>
--- a/C++ 벡터 및 클래스 활용 MFC 윈도우.pptx
+++ b/C++ 벡터 및 클래스 활용 MFC 윈도우.pptx
@@ -126,7 +126,7 @@
   <pc:docChgLst>
     <pc:chgData name="김 진희" userId="dbc7924662182225" providerId="LiveId" clId="{276244A7-C06C-4963-A94C-8366CB0DD214}"/>
     <pc:docChg chg="undo custSel addSld delSld modSld sldOrd">
-      <pc:chgData name="김 진희" userId="dbc7924662182225" providerId="LiveId" clId="{276244A7-C06C-4963-A94C-8366CB0DD214}" dt="2021-11-10T05:38:46.277" v="6361" actId="1036"/>
+      <pc:chgData name="김 진희" userId="dbc7924662182225" providerId="LiveId" clId="{276244A7-C06C-4963-A94C-8366CB0DD214}" dt="2021-11-10T09:07:14.187" v="6375" actId="1037"/>
       <pc:docMkLst>
         <pc:docMk/>
       </pc:docMkLst>
@@ -286,7 +286,7 @@
         </pc:spChg>
       </pc:sldChg>
       <pc:sldChg chg="addSp delSp modSp new mod modClrScheme chgLayout">
-        <pc:chgData name="김 진희" userId="dbc7924662182225" providerId="LiveId" clId="{276244A7-C06C-4963-A94C-8366CB0DD214}" dt="2021-11-10T05:38:46.277" v="6361" actId="1036"/>
+        <pc:chgData name="김 진희" userId="dbc7924662182225" providerId="LiveId" clId="{276244A7-C06C-4963-A94C-8366CB0DD214}" dt="2021-11-10T09:07:14.187" v="6375" actId="1037"/>
         <pc:sldMkLst>
           <pc:docMk/>
           <pc:sldMk cId="4142875052" sldId="262"/>
@@ -372,7 +372,7 @@
           </ac:spMkLst>
         </pc:spChg>
         <pc:spChg chg="add mod">
-          <ac:chgData name="김 진희" userId="dbc7924662182225" providerId="LiveId" clId="{276244A7-C06C-4963-A94C-8366CB0DD214}" dt="2021-11-10T05:22:34.146" v="5320" actId="1036"/>
+          <ac:chgData name="김 진희" userId="dbc7924662182225" providerId="LiveId" clId="{276244A7-C06C-4963-A94C-8366CB0DD214}" dt="2021-11-10T09:07:14.187" v="6375" actId="1037"/>
           <ac:spMkLst>
             <pc:docMk/>
             <pc:sldMk cId="4142875052" sldId="262"/>
@@ -524,7 +524,7 @@
           </ac:cxnSpMkLst>
         </pc:cxnChg>
         <pc:cxnChg chg="add mod">
-          <ac:chgData name="김 진희" userId="dbc7924662182225" providerId="LiveId" clId="{276244A7-C06C-4963-A94C-8366CB0DD214}" dt="2021-11-10T05:22:34.146" v="5320" actId="1036"/>
+          <ac:chgData name="김 진희" userId="dbc7924662182225" providerId="LiveId" clId="{276244A7-C06C-4963-A94C-8366CB0DD214}" dt="2021-11-10T09:07:14.187" v="6375" actId="1037"/>
           <ac:cxnSpMkLst>
             <pc:docMk/>
             <pc:sldMk cId="4142875052" sldId="262"/>
@@ -540,7 +540,7 @@
           </ac:cxnSpMkLst>
         </pc:cxnChg>
         <pc:cxnChg chg="add mod">
-          <ac:chgData name="김 진희" userId="dbc7924662182225" providerId="LiveId" clId="{276244A7-C06C-4963-A94C-8366CB0DD214}" dt="2021-11-10T05:22:34.146" v="5320" actId="1036"/>
+          <ac:chgData name="김 진희" userId="dbc7924662182225" providerId="LiveId" clId="{276244A7-C06C-4963-A94C-8366CB0DD214}" dt="2021-11-10T09:07:14.187" v="6375" actId="1037"/>
           <ac:cxnSpMkLst>
             <pc:docMk/>
             <pc:sldMk cId="4142875052" sldId="262"/>
@@ -548,7 +548,7 @@
           </ac:cxnSpMkLst>
         </pc:cxnChg>
         <pc:cxnChg chg="add mod">
-          <ac:chgData name="김 진희" userId="dbc7924662182225" providerId="LiveId" clId="{276244A7-C06C-4963-A94C-8366CB0DD214}" dt="2021-11-10T05:22:34.146" v="5320" actId="1036"/>
+          <ac:chgData name="김 진희" userId="dbc7924662182225" providerId="LiveId" clId="{276244A7-C06C-4963-A94C-8366CB0DD214}" dt="2021-11-10T09:07:14.187" v="6375" actId="1037"/>
           <ac:cxnSpMkLst>
             <pc:docMk/>
             <pc:sldMk cId="4142875052" sldId="262"/>
@@ -564,7 +564,7 @@
           </ac:cxnSpMkLst>
         </pc:cxnChg>
         <pc:cxnChg chg="add mod">
-          <ac:chgData name="김 진희" userId="dbc7924662182225" providerId="LiveId" clId="{276244A7-C06C-4963-A94C-8366CB0DD214}" dt="2021-11-10T05:22:34.146" v="5320" actId="1036"/>
+          <ac:chgData name="김 진희" userId="dbc7924662182225" providerId="LiveId" clId="{276244A7-C06C-4963-A94C-8366CB0DD214}" dt="2021-11-10T09:07:14.187" v="6375" actId="1037"/>
           <ac:cxnSpMkLst>
             <pc:docMk/>
             <pc:sldMk cId="4142875052" sldId="262"/>
@@ -1115,7 +1115,7 @@
           <a:p>
             <a:fld id="{E8074E9D-9F5D-4A34-B544-7E4C874C41C9}" type="datetimeFigureOut">
               <a:rPr lang="ko-KR" altLang="en-US" smtClean="0"/>
-              <a:t>2021-11-09</a:t>
+              <a:t>2021-11-10</a:t>
             </a:fld>
             <a:endParaRPr lang="ko-KR" altLang="en-US"/>
           </a:p>
@@ -2919,7 +2919,7 @@
           <a:p>
             <a:fld id="{E8074E9D-9F5D-4A34-B544-7E4C874C41C9}" type="datetimeFigureOut">
               <a:rPr lang="ko-KR" altLang="en-US" smtClean="0"/>
-              <a:t>2021-11-09</a:t>
+              <a:t>2021-11-10</a:t>
             </a:fld>
             <a:endParaRPr lang="ko-KR" altLang="en-US"/>
           </a:p>
@@ -3099,7 +3099,7 @@
           <a:p>
             <a:fld id="{E8074E9D-9F5D-4A34-B544-7E4C874C41C9}" type="datetimeFigureOut">
               <a:rPr lang="ko-KR" altLang="en-US" smtClean="0"/>
-              <a:t>2021-11-09</a:t>
+              <a:t>2021-11-10</a:t>
             </a:fld>
             <a:endParaRPr lang="ko-KR" altLang="en-US"/>
           </a:p>
@@ -3274,7 +3274,7 @@
           <a:p>
             <a:fld id="{E8074E9D-9F5D-4A34-B544-7E4C874C41C9}" type="datetimeFigureOut">
               <a:rPr lang="ko-KR" altLang="en-US" smtClean="0"/>
-              <a:t>2021-11-09</a:t>
+              <a:t>2021-11-10</a:t>
             </a:fld>
             <a:endParaRPr lang="ko-KR" altLang="en-US"/>
           </a:p>
@@ -3522,7 +3522,7 @@
           <a:p>
             <a:fld id="{E8074E9D-9F5D-4A34-B544-7E4C874C41C9}" type="datetimeFigureOut">
               <a:rPr lang="ko-KR" altLang="en-US" smtClean="0"/>
-              <a:t>2021-11-09</a:t>
+              <a:t>2021-11-10</a:t>
             </a:fld>
             <a:endParaRPr lang="ko-KR" altLang="en-US"/>
           </a:p>
@@ -5444,7 +5444,7 @@
           <a:p>
             <a:fld id="{E8074E9D-9F5D-4A34-B544-7E4C874C41C9}" type="datetimeFigureOut">
               <a:rPr lang="ko-KR" altLang="en-US" smtClean="0"/>
-              <a:t>2021-11-09</a:t>
+              <a:t>2021-11-10</a:t>
             </a:fld>
             <a:endParaRPr lang="ko-KR" altLang="en-US"/>
           </a:p>
@@ -5880,7 +5880,7 @@
           <a:p>
             <a:fld id="{E8074E9D-9F5D-4A34-B544-7E4C874C41C9}" type="datetimeFigureOut">
               <a:rPr lang="ko-KR" altLang="en-US" smtClean="0"/>
-              <a:t>2021-11-09</a:t>
+              <a:t>2021-11-10</a:t>
             </a:fld>
             <a:endParaRPr lang="ko-KR" altLang="en-US"/>
           </a:p>
@@ -5998,7 +5998,7 @@
           <a:p>
             <a:fld id="{E8074E9D-9F5D-4A34-B544-7E4C874C41C9}" type="datetimeFigureOut">
               <a:rPr lang="ko-KR" altLang="en-US" smtClean="0"/>
-              <a:t>2021-11-09</a:t>
+              <a:t>2021-11-10</a:t>
             </a:fld>
             <a:endParaRPr lang="ko-KR" altLang="en-US"/>
           </a:p>
@@ -6093,7 +6093,7 @@
           <a:p>
             <a:fld id="{E8074E9D-9F5D-4A34-B544-7E4C874C41C9}" type="datetimeFigureOut">
               <a:rPr lang="ko-KR" altLang="en-US" smtClean="0"/>
-              <a:t>2021-11-09</a:t>
+              <a:t>2021-11-10</a:t>
             </a:fld>
             <a:endParaRPr lang="ko-KR" altLang="en-US"/>
           </a:p>
@@ -6390,7 +6390,7 @@
           <a:p>
             <a:fld id="{E8074E9D-9F5D-4A34-B544-7E4C874C41C9}" type="datetimeFigureOut">
               <a:rPr lang="ko-KR" altLang="en-US" smtClean="0"/>
-              <a:t>2021-11-09</a:t>
+              <a:t>2021-11-10</a:t>
             </a:fld>
             <a:endParaRPr lang="ko-KR" altLang="en-US"/>
           </a:p>
@@ -6662,7 +6662,7 @@
           <a:p>
             <a:fld id="{E8074E9D-9F5D-4A34-B544-7E4C874C41C9}" type="datetimeFigureOut">
               <a:rPr lang="ko-KR" altLang="en-US" smtClean="0"/>
-              <a:t>2021-11-09</a:t>
+              <a:t>2021-11-10</a:t>
             </a:fld>
             <a:endParaRPr lang="ko-KR" altLang="en-US"/>
           </a:p>
@@ -9775,7 +9775,7 @@
           <a:p>
             <a:fld id="{E8074E9D-9F5D-4A34-B544-7E4C874C41C9}" type="datetimeFigureOut">
               <a:rPr lang="ko-KR" altLang="en-US" smtClean="0"/>
-              <a:t>2021-11-09</a:t>
+              <a:t>2021-11-10</a:t>
             </a:fld>
             <a:endParaRPr lang="ko-KR" altLang="en-US"/>
           </a:p>
@@ -12122,8 +12122,8 @@
         </p:nvSpPr>
         <p:spPr>
           <a:xfrm>
-            <a:off x="1621535" y="3239805"/>
-            <a:ext cx="2123089" cy="893379"/>
+            <a:off x="1537455" y="3239805"/>
+            <a:ext cx="2281840" cy="893379"/>
           </a:xfrm>
           <a:prstGeom prst="rect">
             <a:avLst/>
@@ -12182,7 +12182,7 @@
                   <a:sysClr val="windowText" lastClr="000000"/>
                 </a:solidFill>
               </a:rPr>
-              <a:t>CDeviceSettingApp</a:t>
+              <a:t>CDeviceSettingAppDlg</a:t>
             </a:r>
             <a:endParaRPr lang="ko-KR" altLang="en-US" dirty="0">
               <a:solidFill>
@@ -12747,6 +12747,7 @@
             </a:extLst>
           </p:cNvPr>
           <p:cNvCxnSpPr>
+            <a:cxnSpLocks/>
             <a:stCxn id="11" idx="2"/>
             <a:endCxn id="13" idx="0"/>
           </p:cNvCxnSpPr>
@@ -12754,8 +12755,8 @@
         </p:nvCxnSpPr>
         <p:spPr>
           <a:xfrm flipH="1">
-            <a:off x="2683080" y="2080627"/>
-            <a:ext cx="1" cy="1159178"/>
+            <a:off x="2678375" y="2080627"/>
+            <a:ext cx="4706" cy="1159178"/>
           </a:xfrm>
           <a:prstGeom prst="straightConnector1">
             <a:avLst/>
@@ -12789,6 +12790,7 @@
             </a:extLst>
           </p:cNvPr>
           <p:cNvCxnSpPr>
+            <a:cxnSpLocks/>
             <a:stCxn id="13" idx="3"/>
             <a:endCxn id="15" idx="1"/>
           </p:cNvCxnSpPr>
@@ -12796,8 +12798,8 @@
         </p:nvCxnSpPr>
         <p:spPr>
           <a:xfrm>
-            <a:off x="3744624" y="3686495"/>
-            <a:ext cx="1795798" cy="0"/>
+            <a:off x="3819295" y="3686495"/>
+            <a:ext cx="1721127" cy="0"/>
           </a:xfrm>
           <a:prstGeom prst="straightConnector1">
             <a:avLst/>
@@ -12831,6 +12833,7 @@
             </a:extLst>
           </p:cNvPr>
           <p:cNvCxnSpPr>
+            <a:cxnSpLocks/>
             <a:stCxn id="13" idx="3"/>
             <a:endCxn id="16" idx="1"/>
           </p:cNvCxnSpPr>
@@ -12838,8 +12841,8 @@
         </p:nvCxnSpPr>
         <p:spPr>
           <a:xfrm>
-            <a:off x="3744624" y="3686495"/>
-            <a:ext cx="1795798" cy="2026288"/>
+            <a:off x="3819295" y="3686495"/>
+            <a:ext cx="1721127" cy="2026288"/>
           </a:xfrm>
           <a:prstGeom prst="straightConnector1">
             <a:avLst/>
@@ -12915,15 +12918,16 @@
             </a:extLst>
           </p:cNvPr>
           <p:cNvCxnSpPr>
+            <a:cxnSpLocks/>
             <a:stCxn id="13" idx="2"/>
             <a:endCxn id="14" idx="0"/>
           </p:cNvCxnSpPr>
           <p:nvPr/>
         </p:nvCxnSpPr>
         <p:spPr>
-          <a:xfrm flipH="1">
-            <a:off x="2683079" y="4133184"/>
-            <a:ext cx="1" cy="1101379"/>
+          <a:xfrm>
+            <a:off x="2678375" y="4133184"/>
+            <a:ext cx="4704" cy="1101379"/>
           </a:xfrm>
           <a:prstGeom prst="straightConnector1">
             <a:avLst/>

</xml_diff>